<commit_message>
changes on full run ?
</commit_message>
<xml_diff>
--- a/SSD Feature Detection Selling points.pptx
+++ b/SSD Feature Detection Selling points.pptx
@@ -5,7 +5,7 @@
     <p:sldMasterId id="2147483673" r:id="rId4"/>
   </p:sldMasterIdLst>
   <p:notesMasterIdLst>
-    <p:notesMasterId r:id="rId26"/>
+    <p:notesMasterId r:id="rId27"/>
   </p:notesMasterIdLst>
   <p:sldIdLst>
     <p:sldId id="257" r:id="rId5"/>
@@ -29,6 +29,7 @@
     <p:sldId id="276" r:id="rId23"/>
     <p:sldId id="268" r:id="rId24"/>
     <p:sldId id="277" r:id="rId25"/>
+    <p:sldId id="278" r:id="rId26"/>
   </p:sldIdLst>
   <p:sldSz cx="12192000" cy="6858000"/>
   <p:notesSz cx="6858000" cy="9144000"/>
@@ -161,6 +162,7 @@
             <p14:sldId id="276"/>
             <p14:sldId id="268"/>
             <p14:sldId id="277"/>
+            <p14:sldId id="278"/>
           </p14:sldIdLst>
         </p14:section>
       </p14:sectionLst>
@@ -257,7 +259,7 @@
           <a:p>
             <a:fld id="{02675569-5933-4727-A940-3926F137A439}" type="datetimeFigureOut">
               <a:rPr lang="en-US" smtClean="0"/>
-              <a:t>8/28/2021</a:t>
+              <a:t>9/28/2021</a:t>
             </a:fld>
             <a:endParaRPr lang="en-US"/>
           </a:p>
@@ -1099,7 +1101,7 @@
           <a:p>
             <a:fld id="{EA0C0817-A112-4847-8014-A94B7D2A4EA3}" type="datetime1">
               <a:rPr lang="en-US" smtClean="0"/>
-              <a:t>8/28/2021</a:t>
+              <a:t>9/28/2021</a:t>
             </a:fld>
             <a:endParaRPr lang="en-US" dirty="0"/>
           </a:p>
@@ -1301,7 +1303,7 @@
           <a:p>
             <a:fld id="{7332B432-ACDA-4023-A761-2BAB76577B62}" type="datetime1">
               <a:rPr lang="en-US" smtClean="0"/>
-              <a:t>8/28/2021</a:t>
+              <a:t>9/28/2021</a:t>
             </a:fld>
             <a:endParaRPr lang="en-US" dirty="0"/>
           </a:p>
@@ -1900,7 +1902,7 @@
           <a:p>
             <a:fld id="{D9C646AA-F36E-4540-911D-FFFC0A0EF24A}" type="datetime1">
               <a:rPr lang="en-US" smtClean="0"/>
-              <a:t>8/28/2021</a:t>
+              <a:t>9/28/2021</a:t>
             </a:fld>
             <a:endParaRPr lang="en-US" dirty="0"/>
           </a:p>
@@ -2220,7 +2222,7 @@
           <a:p>
             <a:fld id="{69186D26-FA5F-4637-B602-B7C2DC34CFD4}" type="datetime1">
               <a:rPr lang="en-US" smtClean="0"/>
-              <a:t>8/28/2021</a:t>
+              <a:t>9/28/2021</a:t>
             </a:fld>
             <a:endParaRPr lang="en-US" dirty="0"/>
           </a:p>
@@ -2657,7 +2659,7 @@
           <a:p>
             <a:fld id="{8A7F15D8-96D1-4781-BC50-CA8A088B2FE4}" type="datetime1">
               <a:rPr lang="en-US" smtClean="0"/>
-              <a:t>8/28/2021</a:t>
+              <a:t>9/28/2021</a:t>
             </a:fld>
             <a:endParaRPr lang="en-US" dirty="0"/>
           </a:p>
@@ -2775,7 +2777,7 @@
           <a:p>
             <a:fld id="{F9A96C99-B8F8-4528-BD05-0E16E943DC09}" type="datetime1">
               <a:rPr lang="en-US" smtClean="0"/>
-              <a:t>8/28/2021</a:t>
+              <a:t>9/28/2021</a:t>
             </a:fld>
             <a:endParaRPr lang="en-US" dirty="0"/>
           </a:p>
@@ -2870,7 +2872,7 @@
           <a:p>
             <a:fld id="{03636942-C211-4B28-8DBD-C953E00AF71B}" type="datetime1">
               <a:rPr lang="en-US" smtClean="0"/>
-              <a:t>8/28/2021</a:t>
+              <a:t>9/28/2021</a:t>
             </a:fld>
             <a:endParaRPr lang="en-US" dirty="0"/>
           </a:p>
@@ -3287,7 +3289,7 @@
           <a:p>
             <a:fld id="{7E8D12A6-918A-48BD-8CB9-CA713993B0EA}" type="datetime1">
               <a:rPr lang="en-US" smtClean="0"/>
-              <a:t>8/28/2021</a:t>
+              <a:t>9/28/2021</a:t>
             </a:fld>
             <a:endParaRPr lang="en-US" dirty="0"/>
           </a:p>
@@ -3549,7 +3551,7 @@
             <a:fld id="{E778CE86-875F-4587-BCF6-FA054AFC0D53}" type="datetime1">
               <a:rPr lang="en-US" smtClean="0"/>
               <a:pPr/>
-              <a:t>8/28/2021</a:t>
+              <a:t>9/28/2021</a:t>
             </a:fld>
             <a:endParaRPr lang="en-US" dirty="0"/>
           </a:p>
@@ -4065,7 +4067,7 @@
           <a:p>
             <a:fld id="{F6FA2B21-3FCD-4721-B95C-427943F61125}" type="datetime1">
               <a:rPr lang="en-US" smtClean="0"/>
-              <a:t>8/28/2021</a:t>
+              <a:t>9/28/2021</a:t>
             </a:fld>
             <a:endParaRPr lang="en-US" dirty="0"/>
           </a:p>
@@ -8413,6 +8415,126 @@
     <p:extLst>
       <p:ext uri="{BB962C8B-B14F-4D97-AF65-F5344CB8AC3E}">
         <p14:creationId xmlns:p14="http://schemas.microsoft.com/office/powerpoint/2010/main" val="2881557596"/>
+      </p:ext>
+    </p:extLst>
+  </p:cSld>
+  <p:clrMapOvr>
+    <a:masterClrMapping/>
+  </p:clrMapOvr>
+</p:sld>
+</file>
+
+<file path=ppt/slides/slide22.xml><?xml version="1.0" encoding="utf-8"?>
+<p:sld xmlns:a="http://schemas.openxmlformats.org/drawingml/2006/main" xmlns:r="http://schemas.openxmlformats.org/officeDocument/2006/relationships" xmlns:p="http://schemas.openxmlformats.org/presentationml/2006/main">
+  <p:cSld>
+    <p:spTree>
+      <p:nvGrpSpPr>
+        <p:cNvPr id="1" name=""/>
+        <p:cNvGrpSpPr/>
+        <p:nvPr/>
+      </p:nvGrpSpPr>
+      <p:grpSpPr>
+        <a:xfrm>
+          <a:off x="0" y="0"/>
+          <a:ext cx="0" cy="0"/>
+          <a:chOff x="0" y="0"/>
+          <a:chExt cx="0" cy="0"/>
+        </a:xfrm>
+      </p:grpSpPr>
+      <p:sp>
+        <p:nvSpPr>
+          <p:cNvPr id="2" name="Title 1">
+            <a:extLst>
+              <a:ext uri="{FF2B5EF4-FFF2-40B4-BE49-F238E27FC236}">
+                <a16:creationId xmlns:a16="http://schemas.microsoft.com/office/drawing/2014/main" id="{765972BD-A68D-46B9-98B5-7C0554D1DCE0}"/>
+              </a:ext>
+            </a:extLst>
+          </p:cNvPr>
+          <p:cNvSpPr>
+            <a:spLocks noGrp="1"/>
+          </p:cNvSpPr>
+          <p:nvPr>
+            <p:ph type="title"/>
+          </p:nvPr>
+        </p:nvSpPr>
+        <p:spPr/>
+        <p:txBody>
+          <a:bodyPr/>
+          <a:lstStyle/>
+          <a:p>
+            <a:r>
+              <a:rPr lang="en-US" dirty="0"/>
+              <a:t>Problems</a:t>
+            </a:r>
+          </a:p>
+        </p:txBody>
+      </p:sp>
+      <p:sp>
+        <p:nvSpPr>
+          <p:cNvPr id="3" name="Content Placeholder 2">
+            <a:extLst>
+              <a:ext uri="{FF2B5EF4-FFF2-40B4-BE49-F238E27FC236}">
+                <a16:creationId xmlns:a16="http://schemas.microsoft.com/office/drawing/2014/main" id="{45BF719A-E4FB-4A50-959C-60FFA6DE485A}"/>
+              </a:ext>
+            </a:extLst>
+          </p:cNvPr>
+          <p:cNvSpPr>
+            <a:spLocks noGrp="1"/>
+          </p:cNvSpPr>
+          <p:nvPr>
+            <p:ph idx="1"/>
+          </p:nvPr>
+        </p:nvSpPr>
+        <p:spPr/>
+        <p:txBody>
+          <a:bodyPr/>
+          <a:lstStyle/>
+          <a:p>
+            <a:r>
+              <a:rPr lang="en-US" sz="2000" dirty="0"/>
+              <a:t>Not recognizing features on cube anymore (wrong training data) ?</a:t>
+            </a:r>
+          </a:p>
+          <a:p>
+            <a:pPr lvl="1"/>
+            <a:r>
+              <a:rPr lang="en-US" sz="1800" dirty="0"/>
+              <a:t>Find differences in HD and low-res cubes </a:t>
+            </a:r>
+          </a:p>
+          <a:p>
+            <a:pPr lvl="1"/>
+            <a:r>
+              <a:rPr lang="en-US" sz="1800" dirty="0"/>
+              <a:t>New training-set required </a:t>
+            </a:r>
+          </a:p>
+          <a:p>
+            <a:r>
+              <a:rPr lang="en-US" sz="2000" dirty="0"/>
+              <a:t>JPGS in weird dimension after turning </a:t>
+            </a:r>
+          </a:p>
+          <a:p>
+            <a:r>
+              <a:rPr lang="en-US" sz="2000" dirty="0"/>
+              <a:t>Slicing </a:t>
+            </a:r>
+            <a:r>
+              <a:rPr lang="en-US" sz="2000"/>
+              <a:t>not working on cubes </a:t>
+            </a:r>
+            <a:endParaRPr lang="en-US" sz="2000" dirty="0"/>
+          </a:p>
+          <a:p>
+            <a:endParaRPr lang="en-US" dirty="0"/>
+          </a:p>
+        </p:txBody>
+      </p:sp>
+    </p:spTree>
+    <p:extLst>
+      <p:ext uri="{BB962C8B-B14F-4D97-AF65-F5344CB8AC3E}">
+        <p14:creationId xmlns:p14="http://schemas.microsoft.com/office/powerpoint/2010/main" val="3519075627"/>
       </p:ext>
     </p:extLst>
   </p:cSld>
@@ -10175,6 +10297,15 @@
 </file>
 
 <file path=customXml/item1.xml><?xml version="1.0" encoding="utf-8"?>
+<?mso-contentType ?>
+<FormTemplates xmlns="http://schemas.microsoft.com/sharepoint/v3/contenttype/forms">
+  <Display>DocumentLibraryForm</Display>
+  <Edit>DocumentLibraryForm</Edit>
+  <New>DocumentLibraryForm</New>
+</FormTemplates>
+</file>
+
+<file path=customXml/item2.xml><?xml version="1.0" encoding="utf-8"?>
 <ct:contentTypeSchema xmlns:ct="http://schemas.microsoft.com/office/2006/metadata/contentType" xmlns:ma="http://schemas.microsoft.com/office/2006/metadata/properties/metaAttributes" ct:_="" ma:_="" ma:contentTypeName="Document" ma:contentTypeID="0x01010079F111ED35F8CC479449609E8A0923A6" ma:contentTypeVersion="12" ma:contentTypeDescription="Create a new document." ma:contentTypeScope="" ma:versionID="a410dd7f93c95333ffa1b60ed6adedd1">
   <xsd:schema xmlns:xsd="http://www.w3.org/2001/XMLSchema" xmlns:xs="http://www.w3.org/2001/XMLSchema" xmlns:p="http://schemas.microsoft.com/office/2006/metadata/properties" xmlns:ns2="71af3243-3dd4-4a8d-8c0d-dd76da1f02a5" xmlns:ns3="16c05727-aa75-4e4a-9b5f-8a80a1165891" targetNamespace="http://schemas.microsoft.com/office/2006/metadata/properties" ma:root="true" ma:fieldsID="a936d9baba76aa3866493feff160faab" ns2:_="" ns3:_="">
     <xsd:import namespace="71af3243-3dd4-4a8d-8c0d-dd76da1f02a5"/>
@@ -10395,15 +10526,6 @@
 </ct:contentTypeSchema>
 </file>
 
-<file path=customXml/item2.xml><?xml version="1.0" encoding="utf-8"?>
-<?mso-contentType ?>
-<FormTemplates xmlns="http://schemas.microsoft.com/sharepoint/v3/contenttype/forms">
-  <Display>DocumentLibraryForm</Display>
-  <Edit>DocumentLibraryForm</Edit>
-  <New>DocumentLibraryForm</New>
-</FormTemplates>
-</file>
-
 <file path=customXml/item3.xml><?xml version="1.0" encoding="utf-8"?>
 <p:properties xmlns:p="http://schemas.microsoft.com/office/2006/metadata/properties" xmlns:xsi="http://www.w3.org/2001/XMLSchema-instance" xmlns:pc="http://schemas.microsoft.com/office/infopath/2007/PartnerControls">
   <documentManagement>
@@ -10414,6 +10536,14 @@
 </file>
 
 <file path=customXml/itemProps1.xml><?xml version="1.0" encoding="utf-8"?>
+<ds:datastoreItem xmlns:ds="http://schemas.openxmlformats.org/officeDocument/2006/customXml" ds:itemID="{CDB58277-F8DF-46FF-84EC-EF41B835E69F}">
+  <ds:schemaRefs>
+    <ds:schemaRef ds:uri="http://schemas.microsoft.com/sharepoint/v3/contenttype/forms"/>
+  </ds:schemaRefs>
+</ds:datastoreItem>
+</file>
+
+<file path=customXml/itemProps2.xml><?xml version="1.0" encoding="utf-8"?>
 <ds:datastoreItem xmlns:ds="http://schemas.openxmlformats.org/officeDocument/2006/customXml" ds:itemID="{2D276E62-80A3-44DD-9BCC-97ED2B99B57F}">
   <ds:schemaRefs>
     <ds:schemaRef ds:uri="http://schemas.microsoft.com/office/2006/metadata/contentType"/>
@@ -10432,14 +10562,6 @@
 </ds:datastoreItem>
 </file>
 
-<file path=customXml/itemProps2.xml><?xml version="1.0" encoding="utf-8"?>
-<ds:datastoreItem xmlns:ds="http://schemas.openxmlformats.org/officeDocument/2006/customXml" ds:itemID="{CDB58277-F8DF-46FF-84EC-EF41B835E69F}">
-  <ds:schemaRefs>
-    <ds:schemaRef ds:uri="http://schemas.microsoft.com/sharepoint/v3/contenttype/forms"/>
-  </ds:schemaRefs>
-</ds:datastoreItem>
-</file>
-
 <file path=customXml/itemProps3.xml><?xml version="1.0" encoding="utf-8"?>
 <ds:datastoreItem xmlns:ds="http://schemas.openxmlformats.org/officeDocument/2006/customXml" ds:itemID="{137651BA-F45C-4845-9AB3-E0A65B39F5E1}">
   <ds:schemaRefs>

</xml_diff>